<commit_message>
update after vibration, begining of waves.
</commit_message>
<xml_diff>
--- a/Slides/PH223_Lecture_20.pptx
+++ b/Slides/PH223_Lecture_20.pptx
@@ -168,10 +168,25 @@
   <pc:docChgLst>
     <pc:chgData name="Lines, Todd" userId="afaf7c3a-e8aa-4568-882a-02ad8f9e19b0" providerId="ADAL" clId="{5FF5AC1B-ABA9-43D7-A1E3-2D92732CD6E2}"/>
     <pc:docChg chg="custSel modSld">
-      <pc:chgData name="Lines, Todd" userId="afaf7c3a-e8aa-4568-882a-02ad8f9e19b0" providerId="ADAL" clId="{5FF5AC1B-ABA9-43D7-A1E3-2D92732CD6E2}" dt="2025-10-16T16:41:59.659" v="6" actId="6549"/>
+      <pc:chgData name="Lines, Todd" userId="afaf7c3a-e8aa-4568-882a-02ad8f9e19b0" providerId="ADAL" clId="{5FF5AC1B-ABA9-43D7-A1E3-2D92732CD6E2}" dt="2025-10-31T21:55:19.974" v="7" actId="1076"/>
       <pc:docMkLst>
         <pc:docMk/>
       </pc:docMkLst>
+      <pc:sldChg chg="modSp mod">
+        <pc:chgData name="Lines, Todd" userId="afaf7c3a-e8aa-4568-882a-02ad8f9e19b0" providerId="ADAL" clId="{5FF5AC1B-ABA9-43D7-A1E3-2D92732CD6E2}" dt="2025-10-31T21:55:19.974" v="7" actId="1076"/>
+        <pc:sldMkLst>
+          <pc:docMk/>
+          <pc:sldMk cId="0" sldId="262"/>
+        </pc:sldMkLst>
+        <pc:picChg chg="mod">
+          <ac:chgData name="Lines, Todd" userId="afaf7c3a-e8aa-4568-882a-02ad8f9e19b0" providerId="ADAL" clId="{5FF5AC1B-ABA9-43D7-A1E3-2D92732CD6E2}" dt="2025-10-31T21:55:19.974" v="7" actId="1076"/>
+          <ac:picMkLst>
+            <pc:docMk/>
+            <pc:sldMk cId="0" sldId="262"/>
+            <ac:picMk id="5124" creationId="{00000000-0000-0000-0000-000000000000}"/>
+          </ac:picMkLst>
+        </pc:picChg>
+      </pc:sldChg>
       <pc:sldChg chg="modSp mod">
         <pc:chgData name="Lines, Todd" userId="afaf7c3a-e8aa-4568-882a-02ad8f9e19b0" providerId="ADAL" clId="{5FF5AC1B-ABA9-43D7-A1E3-2D92732CD6E2}" dt="2025-10-16T16:41:59.659" v="6" actId="6549"/>
         <pc:sldMkLst>
@@ -558,7 +573,7 @@
           <a:p>
             <a:fld id="{196A392B-9B90-4554-AA5F-9EF061AFF381}" type="datetimeFigureOut">
               <a:rPr lang="en-US" smtClean="0"/>
-              <a:t>10/16/2025</a:t>
+              <a:t>10/31/2025</a:t>
             </a:fld>
             <a:endParaRPr lang="en-US"/>
           </a:p>
@@ -1953,7 +1968,7 @@
             <a:fld id="{F6481F1E-66D2-4398-8A86-A9B055527FBD}" type="datetimeFigureOut">
               <a:rPr lang="en-US" smtClean="0"/>
               <a:pPr/>
-              <a:t>10/16/2025</a:t>
+              <a:t>10/31/2025</a:t>
             </a:fld>
             <a:endParaRPr lang="en-US"/>
           </a:p>
@@ -2118,7 +2133,7 @@
             <a:fld id="{F6481F1E-66D2-4398-8A86-A9B055527FBD}" type="datetimeFigureOut">
               <a:rPr lang="en-US" smtClean="0"/>
               <a:pPr/>
-              <a:t>10/16/2025</a:t>
+              <a:t>10/31/2025</a:t>
             </a:fld>
             <a:endParaRPr lang="en-US"/>
           </a:p>
@@ -2293,7 +2308,7 @@
             <a:fld id="{F6481F1E-66D2-4398-8A86-A9B055527FBD}" type="datetimeFigureOut">
               <a:rPr lang="en-US" smtClean="0"/>
               <a:pPr/>
-              <a:t>10/16/2025</a:t>
+              <a:t>10/31/2025</a:t>
             </a:fld>
             <a:endParaRPr lang="en-US"/>
           </a:p>
@@ -2458,7 +2473,7 @@
             <a:fld id="{F6481F1E-66D2-4398-8A86-A9B055527FBD}" type="datetimeFigureOut">
               <a:rPr lang="en-US" smtClean="0"/>
               <a:pPr/>
-              <a:t>10/16/2025</a:t>
+              <a:t>10/31/2025</a:t>
             </a:fld>
             <a:endParaRPr lang="en-US"/>
           </a:p>
@@ -2700,7 +2715,7 @@
             <a:fld id="{F6481F1E-66D2-4398-8A86-A9B055527FBD}" type="datetimeFigureOut">
               <a:rPr lang="en-US" smtClean="0"/>
               <a:pPr/>
-              <a:t>10/16/2025</a:t>
+              <a:t>10/31/2025</a:t>
             </a:fld>
             <a:endParaRPr lang="en-US"/>
           </a:p>
@@ -2982,7 +2997,7 @@
             <a:fld id="{F6481F1E-66D2-4398-8A86-A9B055527FBD}" type="datetimeFigureOut">
               <a:rPr lang="en-US" smtClean="0"/>
               <a:pPr/>
-              <a:t>10/16/2025</a:t>
+              <a:t>10/31/2025</a:t>
             </a:fld>
             <a:endParaRPr lang="en-US"/>
           </a:p>
@@ -3398,7 +3413,7 @@
             <a:fld id="{F6481F1E-66D2-4398-8A86-A9B055527FBD}" type="datetimeFigureOut">
               <a:rPr lang="en-US" smtClean="0"/>
               <a:pPr/>
-              <a:t>10/16/2025</a:t>
+              <a:t>10/31/2025</a:t>
             </a:fld>
             <a:endParaRPr lang="en-US"/>
           </a:p>
@@ -3512,7 +3527,7 @@
             <a:fld id="{F6481F1E-66D2-4398-8A86-A9B055527FBD}" type="datetimeFigureOut">
               <a:rPr lang="en-US" smtClean="0"/>
               <a:pPr/>
-              <a:t>10/16/2025</a:t>
+              <a:t>10/31/2025</a:t>
             </a:fld>
             <a:endParaRPr lang="en-US"/>
           </a:p>
@@ -3604,7 +3619,7 @@
             <a:fld id="{F6481F1E-66D2-4398-8A86-A9B055527FBD}" type="datetimeFigureOut">
               <a:rPr lang="en-US" smtClean="0"/>
               <a:pPr/>
-              <a:t>10/16/2025</a:t>
+              <a:t>10/31/2025</a:t>
             </a:fld>
             <a:endParaRPr lang="en-US"/>
           </a:p>
@@ -3876,7 +3891,7 @@
             <a:fld id="{F6481F1E-66D2-4398-8A86-A9B055527FBD}" type="datetimeFigureOut">
               <a:rPr lang="en-US" smtClean="0"/>
               <a:pPr/>
-              <a:t>10/16/2025</a:t>
+              <a:t>10/31/2025</a:t>
             </a:fld>
             <a:endParaRPr lang="en-US"/>
           </a:p>
@@ -4125,7 +4140,7 @@
             <a:fld id="{F6481F1E-66D2-4398-8A86-A9B055527FBD}" type="datetimeFigureOut">
               <a:rPr lang="en-US" smtClean="0"/>
               <a:pPr/>
-              <a:t>10/16/2025</a:t>
+              <a:t>10/31/2025</a:t>
             </a:fld>
             <a:endParaRPr lang="en-US"/>
           </a:p>
@@ -4333,7 +4348,7 @@
             <a:fld id="{F6481F1E-66D2-4398-8A86-A9B055527FBD}" type="datetimeFigureOut">
               <a:rPr lang="en-US" smtClean="0"/>
               <a:pPr/>
-              <a:t>10/16/2025</a:t>
+              <a:t>10/31/2025</a:t>
             </a:fld>
             <a:endParaRPr lang="en-US"/>
           </a:p>
@@ -15102,7 +15117,7 @@
         </p:blipFill>
         <p:spPr bwMode="auto">
           <a:xfrm>
-            <a:off x="762952" y="2152975"/>
+            <a:off x="892016" y="2159797"/>
             <a:ext cx="7359968" cy="3406768"/>
           </a:xfrm>
           <a:prstGeom prst="rect">

</xml_diff>